<commit_message>
WRI 06 und WRI 07 überarbeitet
</commit_message>
<xml_diff>
--- a/training-cards/agile moves/Writing (WRI)/ger/apprentice/ger_wri_06_Ideen_erzaehlen_AM_A.pptx
+++ b/training-cards/agile moves/Writing (WRI)/ger/apprentice/ger_wri_06_Ideen_erzaehlen_AM_A.pptx
@@ -983,7 +983,7 @@
         </p:nvSpPr>
         <p:spPr>
           <a:xfrm>
-            <a:off x="1174411" y="860490"/>
+            <a:off x="1174411" y="875088"/>
             <a:ext cx="3673461" cy="461661"/>
           </a:xfrm>
           <a:prstGeom prst="rect">
@@ -1104,7 +1104,7 @@
                 <a:latin typeface="Avenir Light"/>
                 <a:cs typeface="Avenir Light"/>
               </a:rPr>
-              <a:t>02.11.15</a:t>
+              <a:t>10.11.15</a:t>
             </a:fld>
             <a:endParaRPr lang="de-DE" sz="600" dirty="0">
               <a:solidFill>
@@ -1169,26 +1169,7 @@
                 <a:cs typeface="Avenir Light"/>
                 <a:sym typeface="Calibri"/>
               </a:rPr>
-              <a:t>To view a copy of this license, visit </a:t>
-            </a:r>
-            <a:r>
-              <a:rPr sz="600" dirty="0">
-                <a:latin typeface="Avenir Light"/>
-                <a:ea typeface="Calibri"/>
-                <a:cs typeface="Avenir Light"/>
-                <a:sym typeface="Calibri"/>
-                <a:hlinkClick r:id="rId4"/>
-              </a:rPr>
-              <a:t>http://creativecommons.org/licenses/by-nc-nd/4.0/</a:t>
-            </a:r>
-            <a:r>
-              <a:rPr sz="600" dirty="0">
-                <a:latin typeface="Avenir Light"/>
-                <a:ea typeface="Calibri"/>
-                <a:cs typeface="Avenir Light"/>
-                <a:sym typeface="Calibri"/>
-              </a:rPr>
-              <a:t>.</a:t>
+              <a:t>To view a copy of this license, visit http://creativecommons.org/licenses/by-nc-nd/4.0/.</a:t>
             </a:r>
           </a:p>
         </p:txBody>
@@ -1200,7 +1181,7 @@
           <p:nvPr userDrawn="1"/>
         </p:nvPicPr>
         <p:blipFill>
-          <a:blip r:embed="rId5">
+          <a:blip r:embed="rId4">
             <a:extLst/>
           </a:blip>
           <a:stretch>
@@ -1768,7 +1749,7 @@
                 <a:latin typeface="Avenir Light"/>
                 <a:cs typeface="Avenir Light"/>
               </a:rPr>
-              <a:t>02.11.15</a:t>
+              <a:t>10.11.15</a:t>
             </a:fld>
             <a:endParaRPr lang="de-DE" sz="600" dirty="0">
               <a:solidFill>
@@ -2497,7 +2478,7 @@
                 <a:latin typeface="Avenir Light"/>
                 <a:cs typeface="Avenir Light"/>
               </a:rPr>
-              <a:t>02.11.15</a:t>
+              <a:t>10.11.15</a:t>
             </a:fld>
             <a:endParaRPr lang="de-DE" sz="600" dirty="0">
               <a:solidFill>
@@ -2562,26 +2543,7 @@
                 <a:cs typeface="Avenir Light"/>
                 <a:sym typeface="Calibri"/>
               </a:rPr>
-              <a:t>To view a copy of this license, visit </a:t>
-            </a:r>
-            <a:r>
-              <a:rPr sz="600" dirty="0">
-                <a:latin typeface="Avenir Light"/>
-                <a:ea typeface="Calibri"/>
-                <a:cs typeface="Avenir Light"/>
-                <a:sym typeface="Calibri"/>
-                <a:hlinkClick r:id="rId3"/>
-              </a:rPr>
-              <a:t>http://creativecommons.org/licenses/by-nc-nd/4.0/</a:t>
-            </a:r>
-            <a:r>
-              <a:rPr sz="600" dirty="0">
-                <a:latin typeface="Avenir Light"/>
-                <a:ea typeface="Calibri"/>
-                <a:cs typeface="Avenir Light"/>
-                <a:sym typeface="Calibri"/>
-              </a:rPr>
-              <a:t>.</a:t>
+              <a:t>To view a copy of this license, visit http://creativecommons.org/licenses/by-nc-nd/4.0/.</a:t>
             </a:r>
           </a:p>
         </p:txBody>
@@ -2593,7 +2555,7 @@
           <p:nvPr userDrawn="1"/>
         </p:nvPicPr>
         <p:blipFill>
-          <a:blip r:embed="rId4">
+          <a:blip r:embed="rId3">
             <a:extLst/>
           </a:blip>
           <a:stretch>
@@ -2622,7 +2584,7 @@
           <p:nvPr userDrawn="1"/>
         </p:nvPicPr>
         <p:blipFill>
-          <a:blip r:embed="rId5">
+          <a:blip r:embed="rId4">
             <a:extLst>
               <a:ext uri="{28A0092B-C50C-407E-A947-70E740481C1C}">
                 <a14:useLocalDpi xmlns:a14="http://schemas.microsoft.com/office/drawing/2010/main" val="0"/>
@@ -3750,7 +3712,12 @@
             <p:ph type="title"/>
           </p:nvPr>
         </p:nvSpPr>
-        <p:spPr/>
+        <p:spPr>
+          <a:xfrm>
+            <a:off x="1166812" y="650765"/>
+            <a:ext cx="5533296" cy="461667"/>
+          </a:xfrm>
+        </p:spPr>
         <p:txBody>
           <a:bodyPr/>
           <a:lstStyle/>
@@ -3829,15 +3796,7 @@
             </a:r>
             <a:r>
               <a:rPr lang="de-DE" sz="1100" dirty="0" smtClean="0"/>
-              <a:t> mit Deinen Schreibideen erstellt (WRI 02) und es priorisiert hast (</a:t>
-            </a:r>
-            <a:r>
-              <a:rPr lang="de-DE" sz="1100" smtClean="0"/>
-              <a:t>WRI 05)</a:t>
-            </a:r>
-            <a:r>
-              <a:rPr lang="de-DE" sz="1100" dirty="0" smtClean="0"/>
-              <a:t>, ist der nächste Schritt, anderen von Deinen Ideen zu erzählen. </a:t>
+              <a:t> mit Deinen Schreibideen erstellt (WRI 02) und es priorisiert hast (WRI 05), ist der nächste Schritt, anderen von Deinen Ideen zu erzählen. </a:t>
             </a:r>
           </a:p>
           <a:p>
@@ -3974,11 +3933,7 @@
             </a:pPr>
             <a:r>
               <a:rPr lang="de-DE" sz="1100" dirty="0" smtClean="0"/>
-              <a:t>Nimm </a:t>
-            </a:r>
-            <a:r>
-              <a:rPr lang="de-DE" sz="1100" dirty="0" smtClean="0"/>
-              <a:t>eine </a:t>
+              <a:t>Nimm eine </a:t>
             </a:r>
             <a:r>
               <a:rPr lang="de-DE" sz="1100" dirty="0"/>
@@ -3994,8 +3949,9 @@
             </a:r>
             <a:r>
               <a:rPr lang="de-DE" sz="1100" dirty="0" smtClean="0"/>
-              <a:t>..</a:t>
-            </a:r>
+              <a:t>.</a:t>
+            </a:r>
+            <a:endParaRPr lang="de-DE" sz="1100" dirty="0" smtClean="0"/>
           </a:p>
           <a:p>
             <a:pPr>
@@ -4008,31 +3964,20 @@
             </a:pPr>
             <a:r>
               <a:rPr lang="de-DE" sz="1100" dirty="0" smtClean="0"/>
-              <a:t>Suche Dir einen oder mehrere Gesprächspartner und diskutiere </a:t>
-            </a:r>
-            <a:r>
-              <a:rPr lang="de-DE" sz="1100" dirty="0" smtClean="0"/>
-              <a:t>über </a:t>
-            </a:r>
-            <a:r>
-              <a:rPr lang="de-DE" sz="1100" dirty="0" smtClean="0"/>
-              <a:t>Deine Idee </a:t>
-            </a:r>
-            <a:r>
-              <a:rPr lang="de-DE" sz="1100" dirty="0" smtClean="0"/>
-              <a:t/>
+              <a:t>Suche Dir einen oder mehrere Gesprächspartner und diskutiere über Deine Idee </a:t>
             </a:r>
             <a:br>
               <a:rPr lang="de-DE" sz="1100" dirty="0" smtClean="0"/>
             </a:br>
             <a:r>
               <a:rPr lang="de-DE" sz="1100" dirty="0" smtClean="0"/>
-              <a:t>(</a:t>
+              <a:t>(z.B. eine Tomate lang , siehe Trainingskarte TOM 01</a:t>
             </a:r>
             <a:r>
               <a:rPr lang="de-DE" sz="1100" dirty="0" smtClean="0"/>
-              <a:t>z.B. eine Tomate lang , siehe Trainingskarte TOM 01)</a:t>
-            </a:r>
+              <a:t>).</a:t>
+            </a:r>
+            <a:endParaRPr lang="de-DE" sz="1100" dirty="0" smtClean="0"/>
           </a:p>
           <a:p>
             <a:pPr>
@@ -4078,23 +4023,7 @@
             </a:br>
             <a:r>
               <a:rPr lang="de-DE" sz="1100" dirty="0" smtClean="0"/>
-              <a:t>Du kannst </a:t>
-            </a:r>
-            <a:r>
-              <a:rPr lang="de-DE" sz="1100" dirty="0" smtClean="0"/>
-              <a:t>jedes Mal </a:t>
-            </a:r>
-            <a:r>
-              <a:rPr lang="de-DE" sz="1100" dirty="0" smtClean="0"/>
-              <a:t>über eine andere Idee diskutieren oder auch verschiedene Diskussionen mit unterschiedlichen </a:t>
-            </a:r>
-            <a:r>
-              <a:rPr lang="de-DE" sz="1100" dirty="0" smtClean="0"/>
-              <a:t>Gesprächspartnern </a:t>
-            </a:r>
-            <a:r>
-              <a:rPr lang="de-DE" sz="1100" dirty="0" smtClean="0"/>
-              <a:t>zu einer Idee haben.</a:t>
+              <a:t>Du kannst jedes Mal über eine andere Idee diskutieren oder auch verschiedene Diskussionen mit unterschiedlichen Gesprächspartnern zu einer Idee haben.</a:t>
             </a:r>
           </a:p>
           <a:p>
@@ -4117,20 +4046,12 @@
               <a:rPr lang="de-DE" sz="1100" dirty="0" smtClean="0"/>
               <a:t>nicht darum, die Idee zu bewerten, sondern darum, Perspektiven</a:t>
             </a:r>
-            <a:r>
-              <a:rPr lang="de-DE" sz="1100" smtClean="0"/>
-              <a:t/>
-            </a:r>
             <a:br>
-              <a:rPr lang="de-DE" sz="1100" smtClean="0"/>
+              <a:rPr lang="de-DE" sz="1100" dirty="0" smtClean="0"/>
             </a:br>
             <a:r>
-              <a:rPr lang="de-DE" sz="1100" smtClean="0"/>
-              <a:t>auszutauschen </a:t>
-            </a:r>
-            <a:r>
               <a:rPr lang="de-DE" sz="1100" dirty="0" smtClean="0"/>
-              <a:t>und sich inspirieren zu lassen!</a:t>
+              <a:t>auszutauschen und sich inspirieren zu lassen!</a:t>
             </a:r>
           </a:p>
           <a:p>

</xml_diff>